<commit_message>
power point (not finished)
</commit_message>
<xml_diff>
--- a/report/פרויקט סיום קורס בוויזואליזציה.pptx
+++ b/report/פרויקט סיום קורס בוויזואליזציה.pptx
@@ -11,6 +11,9 @@
     <p:sldId id="260" r:id="rId5"/>
     <p:sldId id="261" r:id="rId6"/>
     <p:sldId id="262" r:id="rId7"/>
+    <p:sldId id="263" r:id="rId8"/>
+    <p:sldId id="264" r:id="rId9"/>
+    <p:sldId id="265" r:id="rId10"/>
   </p:sldIdLst>
   <p:sldSz cx="12192000" cy="6858000"/>
   <p:notesSz cx="6858000" cy="9144000"/>
@@ -109,6 +112,11 @@
       </a:defRPr>
     </a:lvl9pPr>
   </p:defaultTextStyle>
+  <p:extLst>
+    <p:ext uri="{EFAFB233-063F-42B5-8137-9DF3F51BA10A}">
+      <p15:sldGuideLst xmlns:p15="http://schemas.microsoft.com/office/powerpoint/2012/main"/>
+    </p:ext>
+  </p:extLst>
 </p:presentation>
 </file>
 
@@ -259,7 +267,7 @@
           <a:p>
             <a:fld id="{0A945A3D-C017-4E7B-AF12-AA8C5B6690B0}" type="datetimeFigureOut">
               <a:rPr lang="en-US" smtClean="0"/>
-              <a:t>6/25/2022</a:t>
+              <a:t>6/26/2022</a:t>
             </a:fld>
             <a:endParaRPr lang="en-US"/>
           </a:p>
@@ -457,7 +465,7 @@
           <a:p>
             <a:fld id="{0A945A3D-C017-4E7B-AF12-AA8C5B6690B0}" type="datetimeFigureOut">
               <a:rPr lang="en-US" smtClean="0"/>
-              <a:t>6/25/2022</a:t>
+              <a:t>6/26/2022</a:t>
             </a:fld>
             <a:endParaRPr lang="en-US"/>
           </a:p>
@@ -665,7 +673,7 @@
           <a:p>
             <a:fld id="{0A945A3D-C017-4E7B-AF12-AA8C5B6690B0}" type="datetimeFigureOut">
               <a:rPr lang="en-US" smtClean="0"/>
-              <a:t>6/25/2022</a:t>
+              <a:t>6/26/2022</a:t>
             </a:fld>
             <a:endParaRPr lang="en-US"/>
           </a:p>
@@ -863,7 +871,7 @@
           <a:p>
             <a:fld id="{0A945A3D-C017-4E7B-AF12-AA8C5B6690B0}" type="datetimeFigureOut">
               <a:rPr lang="en-US" smtClean="0"/>
-              <a:t>6/25/2022</a:t>
+              <a:t>6/26/2022</a:t>
             </a:fld>
             <a:endParaRPr lang="en-US"/>
           </a:p>
@@ -1138,7 +1146,7 @@
           <a:p>
             <a:fld id="{0A945A3D-C017-4E7B-AF12-AA8C5B6690B0}" type="datetimeFigureOut">
               <a:rPr lang="en-US" smtClean="0"/>
-              <a:t>6/25/2022</a:t>
+              <a:t>6/26/2022</a:t>
             </a:fld>
             <a:endParaRPr lang="en-US"/>
           </a:p>
@@ -1403,7 +1411,7 @@
           <a:p>
             <a:fld id="{0A945A3D-C017-4E7B-AF12-AA8C5B6690B0}" type="datetimeFigureOut">
               <a:rPr lang="en-US" smtClean="0"/>
-              <a:t>6/25/2022</a:t>
+              <a:t>6/26/2022</a:t>
             </a:fld>
             <a:endParaRPr lang="en-US"/>
           </a:p>
@@ -1815,7 +1823,7 @@
           <a:p>
             <a:fld id="{0A945A3D-C017-4E7B-AF12-AA8C5B6690B0}" type="datetimeFigureOut">
               <a:rPr lang="en-US" smtClean="0"/>
-              <a:t>6/25/2022</a:t>
+              <a:t>6/26/2022</a:t>
             </a:fld>
             <a:endParaRPr lang="en-US"/>
           </a:p>
@@ -1956,7 +1964,7 @@
           <a:p>
             <a:fld id="{0A945A3D-C017-4E7B-AF12-AA8C5B6690B0}" type="datetimeFigureOut">
               <a:rPr lang="en-US" smtClean="0"/>
-              <a:t>6/25/2022</a:t>
+              <a:t>6/26/2022</a:t>
             </a:fld>
             <a:endParaRPr lang="en-US"/>
           </a:p>
@@ -2069,7 +2077,7 @@
           <a:p>
             <a:fld id="{0A945A3D-C017-4E7B-AF12-AA8C5B6690B0}" type="datetimeFigureOut">
               <a:rPr lang="en-US" smtClean="0"/>
-              <a:t>6/25/2022</a:t>
+              <a:t>6/26/2022</a:t>
             </a:fld>
             <a:endParaRPr lang="en-US"/>
           </a:p>
@@ -2380,7 +2388,7 @@
           <a:p>
             <a:fld id="{0A945A3D-C017-4E7B-AF12-AA8C5B6690B0}" type="datetimeFigureOut">
               <a:rPr lang="en-US" smtClean="0"/>
-              <a:t>6/25/2022</a:t>
+              <a:t>6/26/2022</a:t>
             </a:fld>
             <a:endParaRPr lang="en-US"/>
           </a:p>
@@ -2668,7 +2676,7 @@
           <a:p>
             <a:fld id="{0A945A3D-C017-4E7B-AF12-AA8C5B6690B0}" type="datetimeFigureOut">
               <a:rPr lang="en-US" smtClean="0"/>
-              <a:t>6/25/2022</a:t>
+              <a:t>6/26/2022</a:t>
             </a:fld>
             <a:endParaRPr lang="en-US"/>
           </a:p>
@@ -2909,7 +2917,7 @@
           <a:p>
             <a:fld id="{0A945A3D-C017-4E7B-AF12-AA8C5B6690B0}" type="datetimeFigureOut">
               <a:rPr lang="en-US" smtClean="0"/>
-              <a:t>6/25/2022</a:t>
+              <a:t>6/26/2022</a:t>
             </a:fld>
             <a:endParaRPr lang="en-US"/>
           </a:p>
@@ -7696,6 +7704,9 @@
                     <p:cTn id="3" fill="hold">
                       <p:stCondLst>
                         <p:cond delay="indefinite"/>
+                        <p:cond evt="onBegin" delay="0">
+                          <p:tn val="2"/>
+                        </p:cond>
                       </p:stCondLst>
                       <p:childTnLst>
                         <p:par>
@@ -7705,7 +7716,7 @@
                             </p:stCondLst>
                             <p:childTnLst>
                               <p:par>
-                                <p:cTn id="5" presetID="16" presetClass="entr" presetSubtype="21" fill="hold" grpId="0" nodeType="clickEffect">
+                                <p:cTn id="5" presetID="16" presetClass="entr" presetSubtype="21" fill="hold" grpId="0" nodeType="withEffect">
                                   <p:stCondLst>
                                     <p:cond delay="0"/>
                                   </p:stCondLst>
@@ -8381,6 +8392,147 @@
           </a:p>
         </p:txBody>
       </p:sp>
+      <p:pic>
+        <p:nvPicPr>
+          <p:cNvPr id="1026" name="Picture 2" descr="Google Colab">
+            <a:extLst>
+              <a:ext uri="{FF2B5EF4-FFF2-40B4-BE49-F238E27FC236}">
+                <a16:creationId xmlns:a16="http://schemas.microsoft.com/office/drawing/2014/main" id="{5449281E-2176-48A0-1134-5B4BE42EE6BD}"/>
+              </a:ext>
+            </a:extLst>
+          </p:cNvPr>
+          <p:cNvPicPr>
+            <a:picLocks noChangeAspect="1" noChangeArrowheads="1"/>
+          </p:cNvPicPr>
+          <p:nvPr/>
+        </p:nvPicPr>
+        <p:blipFill>
+          <a:blip r:embed="rId2">
+            <a:extLst>
+              <a:ext uri="{28A0092B-C50C-407E-A947-70E740481C1C}">
+                <a14:useLocalDpi xmlns:a14="http://schemas.microsoft.com/office/drawing/2010/main" val="0"/>
+              </a:ext>
+            </a:extLst>
+          </a:blip>
+          <a:srcRect/>
+          <a:stretch>
+            <a:fillRect/>
+          </a:stretch>
+        </p:blipFill>
+        <p:spPr bwMode="auto">
+          <a:xfrm rot="20545600">
+            <a:off x="127000" y="587348"/>
+            <a:ext cx="1741170" cy="1741170"/>
+          </a:xfrm>
+          <a:prstGeom prst="rect">
+            <a:avLst/>
+          </a:prstGeom>
+          <a:noFill/>
+          <a:extLst>
+            <a:ext uri="{909E8E84-426E-40DD-AFC4-6F175D3DCCD1}">
+              <a14:hiddenFill xmlns:a14="http://schemas.microsoft.com/office/drawing/2010/main">
+                <a:solidFill>
+                  <a:srgbClr val="FFFFFF"/>
+                </a:solidFill>
+              </a14:hiddenFill>
+            </a:ext>
+          </a:extLst>
+        </p:spPr>
+      </p:pic>
+      <p:pic>
+        <p:nvPicPr>
+          <p:cNvPr id="1028" name="Picture 4" descr="GitHub להורדה בחינם - הגרסא העדכנית ביותר ל-2022">
+            <a:extLst>
+              <a:ext uri="{FF2B5EF4-FFF2-40B4-BE49-F238E27FC236}">
+                <a16:creationId xmlns:a16="http://schemas.microsoft.com/office/drawing/2014/main" id="{68F62DE1-6CC8-7841-C0F2-1DDE642F700E}"/>
+              </a:ext>
+            </a:extLst>
+          </p:cNvPr>
+          <p:cNvPicPr>
+            <a:picLocks noChangeAspect="1" noChangeArrowheads="1"/>
+          </p:cNvPicPr>
+          <p:nvPr/>
+        </p:nvPicPr>
+        <p:blipFill>
+          <a:blip r:embed="rId3">
+            <a:extLst>
+              <a:ext uri="{28A0092B-C50C-407E-A947-70E740481C1C}">
+                <a14:useLocalDpi xmlns:a14="http://schemas.microsoft.com/office/drawing/2010/main" val="0"/>
+              </a:ext>
+            </a:extLst>
+          </a:blip>
+          <a:srcRect/>
+          <a:stretch>
+            <a:fillRect/>
+          </a:stretch>
+        </p:blipFill>
+        <p:spPr bwMode="auto">
+          <a:xfrm>
+            <a:off x="698643" y="3289808"/>
+            <a:ext cx="2529726" cy="1422971"/>
+          </a:xfrm>
+          <a:prstGeom prst="rect">
+            <a:avLst/>
+          </a:prstGeom>
+          <a:noFill/>
+          <a:extLst>
+            <a:ext uri="{909E8E84-426E-40DD-AFC4-6F175D3DCCD1}">
+              <a14:hiddenFill xmlns:a14="http://schemas.microsoft.com/office/drawing/2010/main">
+                <a:solidFill>
+                  <a:srgbClr val="FFFFFF"/>
+                </a:solidFill>
+              </a14:hiddenFill>
+            </a:ext>
+          </a:extLst>
+        </p:spPr>
+      </p:pic>
+      <p:pic>
+        <p:nvPicPr>
+          <p:cNvPr id="1030" name="Picture 6" descr="Dash">
+            <a:extLst>
+              <a:ext uri="{FF2B5EF4-FFF2-40B4-BE49-F238E27FC236}">
+                <a16:creationId xmlns:a16="http://schemas.microsoft.com/office/drawing/2014/main" id="{61CE3473-563C-85EA-C8A7-30D54C963DCC}"/>
+              </a:ext>
+            </a:extLst>
+          </p:cNvPr>
+          <p:cNvPicPr>
+            <a:picLocks noChangeAspect="1" noChangeArrowheads="1"/>
+          </p:cNvPicPr>
+          <p:nvPr/>
+        </p:nvPicPr>
+        <p:blipFill>
+          <a:blip r:embed="rId4">
+            <a:extLst>
+              <a:ext uri="{28A0092B-C50C-407E-A947-70E740481C1C}">
+                <a14:useLocalDpi xmlns:a14="http://schemas.microsoft.com/office/drawing/2010/main" val="0"/>
+              </a:ext>
+            </a:extLst>
+          </a:blip>
+          <a:srcRect/>
+          <a:stretch>
+            <a:fillRect/>
+          </a:stretch>
+        </p:blipFill>
+        <p:spPr bwMode="auto">
+          <a:xfrm rot="257672">
+            <a:off x="1361469" y="5338762"/>
+            <a:ext cx="1866900" cy="838200"/>
+          </a:xfrm>
+          <a:prstGeom prst="rect">
+            <a:avLst/>
+          </a:prstGeom>
+          <a:noFill/>
+          <a:extLst>
+            <a:ext uri="{909E8E84-426E-40DD-AFC4-6F175D3DCCD1}">
+              <a14:hiddenFill xmlns:a14="http://schemas.microsoft.com/office/drawing/2010/main">
+                <a:solidFill>
+                  <a:srgbClr val="FFFFFF"/>
+                </a:solidFill>
+              </a14:hiddenFill>
+            </a:ext>
+          </a:extLst>
+        </p:spPr>
+      </p:pic>
     </p:spTree>
     <p:extLst>
       <p:ext uri="{BB962C8B-B14F-4D97-AF65-F5344CB8AC3E}">
@@ -8391,6 +8543,648 @@
   <p:clrMapOvr>
     <a:masterClrMapping/>
   </p:clrMapOvr>
+  <p:timing>
+    <p:tnLst>
+      <p:par>
+        <p:cTn id="1" dur="indefinite" restart="never" nodeType="tmRoot">
+          <p:childTnLst>
+            <p:seq concurrent="1" nextAc="seek">
+              <p:cTn id="2" dur="indefinite" nodeType="mainSeq">
+                <p:childTnLst>
+                  <p:par>
+                    <p:cTn id="3" fill="hold">
+                      <p:stCondLst>
+                        <p:cond delay="indefinite"/>
+                        <p:cond evt="onBegin" delay="0">
+                          <p:tn val="2"/>
+                        </p:cond>
+                      </p:stCondLst>
+                      <p:childTnLst>
+                        <p:par>
+                          <p:cTn id="4" fill="hold">
+                            <p:stCondLst>
+                              <p:cond delay="0"/>
+                            </p:stCondLst>
+                            <p:childTnLst>
+                              <p:par>
+                                <p:cTn id="5" presetID="10" presetClass="entr" presetSubtype="0" fill="hold" grpId="0" nodeType="afterEffect">
+                                  <p:stCondLst>
+                                    <p:cond delay="0"/>
+                                  </p:stCondLst>
+                                  <p:childTnLst>
+                                    <p:set>
+                                      <p:cBhvr>
+                                        <p:cTn id="6" dur="1" fill="hold">
+                                          <p:stCondLst>
+                                            <p:cond delay="0"/>
+                                          </p:stCondLst>
+                                        </p:cTn>
+                                        <p:tgtEl>
+                                          <p:spTgt spid="2"/>
+                                        </p:tgtEl>
+                                        <p:attrNameLst>
+                                          <p:attrName>style.visibility</p:attrName>
+                                        </p:attrNameLst>
+                                      </p:cBhvr>
+                                      <p:to>
+                                        <p:strVal val="visible"/>
+                                      </p:to>
+                                    </p:set>
+                                    <p:animEffect transition="in" filter="fade">
+                                      <p:cBhvr>
+                                        <p:cTn id="7" dur="500"/>
+                                        <p:tgtEl>
+                                          <p:spTgt spid="2"/>
+                                        </p:tgtEl>
+                                      </p:cBhvr>
+                                    </p:animEffect>
+                                  </p:childTnLst>
+                                </p:cTn>
+                              </p:par>
+                            </p:childTnLst>
+                          </p:cTn>
+                        </p:par>
+                      </p:childTnLst>
+                    </p:cTn>
+                  </p:par>
+                  <p:par>
+                    <p:cTn id="8" fill="hold">
+                      <p:stCondLst>
+                        <p:cond delay="indefinite"/>
+                      </p:stCondLst>
+                      <p:childTnLst>
+                        <p:par>
+                          <p:cTn id="9" fill="hold">
+                            <p:stCondLst>
+                              <p:cond delay="0"/>
+                            </p:stCondLst>
+                            <p:childTnLst>
+                              <p:par>
+                                <p:cTn id="10" presetID="10" presetClass="entr" presetSubtype="0" fill="hold" nodeType="clickEffect">
+                                  <p:stCondLst>
+                                    <p:cond delay="0"/>
+                                  </p:stCondLst>
+                                  <p:childTnLst>
+                                    <p:set>
+                                      <p:cBhvr>
+                                        <p:cTn id="11" dur="1" fill="hold">
+                                          <p:stCondLst>
+                                            <p:cond delay="0"/>
+                                          </p:stCondLst>
+                                        </p:cTn>
+                                        <p:tgtEl>
+                                          <p:spTgt spid="3">
+                                            <p:txEl>
+                                              <p:pRg st="0" end="0"/>
+                                            </p:txEl>
+                                          </p:spTgt>
+                                        </p:tgtEl>
+                                        <p:attrNameLst>
+                                          <p:attrName>style.visibility</p:attrName>
+                                        </p:attrNameLst>
+                                      </p:cBhvr>
+                                      <p:to>
+                                        <p:strVal val="visible"/>
+                                      </p:to>
+                                    </p:set>
+                                    <p:animEffect transition="in" filter="fade">
+                                      <p:cBhvr>
+                                        <p:cTn id="12" dur="750"/>
+                                        <p:tgtEl>
+                                          <p:spTgt spid="3">
+                                            <p:txEl>
+                                              <p:pRg st="0" end="0"/>
+                                            </p:txEl>
+                                          </p:spTgt>
+                                        </p:tgtEl>
+                                      </p:cBhvr>
+                                    </p:animEffect>
+                                  </p:childTnLst>
+                                </p:cTn>
+                              </p:par>
+                              <p:par>
+                                <p:cTn id="13" presetID="31" presetClass="entr" presetSubtype="0" fill="hold" nodeType="withEffect">
+                                  <p:stCondLst>
+                                    <p:cond delay="0"/>
+                                  </p:stCondLst>
+                                  <p:childTnLst>
+                                    <p:set>
+                                      <p:cBhvr>
+                                        <p:cTn id="14" dur="1" fill="hold">
+                                          <p:stCondLst>
+                                            <p:cond delay="0"/>
+                                          </p:stCondLst>
+                                        </p:cTn>
+                                        <p:tgtEl>
+                                          <p:spTgt spid="1026"/>
+                                        </p:tgtEl>
+                                        <p:attrNameLst>
+                                          <p:attrName>style.visibility</p:attrName>
+                                        </p:attrNameLst>
+                                      </p:cBhvr>
+                                      <p:to>
+                                        <p:strVal val="visible"/>
+                                      </p:to>
+                                    </p:set>
+                                    <p:anim calcmode="lin" valueType="num">
+                                      <p:cBhvr>
+                                        <p:cTn id="15" dur="1000" fill="hold"/>
+                                        <p:tgtEl>
+                                          <p:spTgt spid="1026"/>
+                                        </p:tgtEl>
+                                        <p:attrNameLst>
+                                          <p:attrName>ppt_w</p:attrName>
+                                        </p:attrNameLst>
+                                      </p:cBhvr>
+                                      <p:tavLst>
+                                        <p:tav tm="0">
+                                          <p:val>
+                                            <p:fltVal val="0"/>
+                                          </p:val>
+                                        </p:tav>
+                                        <p:tav tm="100000">
+                                          <p:val>
+                                            <p:strVal val="#ppt_w"/>
+                                          </p:val>
+                                        </p:tav>
+                                      </p:tavLst>
+                                    </p:anim>
+                                    <p:anim calcmode="lin" valueType="num">
+                                      <p:cBhvr>
+                                        <p:cTn id="16" dur="1000" fill="hold"/>
+                                        <p:tgtEl>
+                                          <p:spTgt spid="1026"/>
+                                        </p:tgtEl>
+                                        <p:attrNameLst>
+                                          <p:attrName>ppt_h</p:attrName>
+                                        </p:attrNameLst>
+                                      </p:cBhvr>
+                                      <p:tavLst>
+                                        <p:tav tm="0">
+                                          <p:val>
+                                            <p:fltVal val="0"/>
+                                          </p:val>
+                                        </p:tav>
+                                        <p:tav tm="100000">
+                                          <p:val>
+                                            <p:strVal val="#ppt_h"/>
+                                          </p:val>
+                                        </p:tav>
+                                      </p:tavLst>
+                                    </p:anim>
+                                    <p:anim calcmode="lin" valueType="num">
+                                      <p:cBhvr>
+                                        <p:cTn id="17" dur="1000" fill="hold"/>
+                                        <p:tgtEl>
+                                          <p:spTgt spid="1026"/>
+                                        </p:tgtEl>
+                                        <p:attrNameLst>
+                                          <p:attrName>style.rotation</p:attrName>
+                                        </p:attrNameLst>
+                                      </p:cBhvr>
+                                      <p:tavLst>
+                                        <p:tav tm="0">
+                                          <p:val>
+                                            <p:fltVal val="90"/>
+                                          </p:val>
+                                        </p:tav>
+                                        <p:tav tm="100000">
+                                          <p:val>
+                                            <p:fltVal val="0"/>
+                                          </p:val>
+                                        </p:tav>
+                                      </p:tavLst>
+                                    </p:anim>
+                                    <p:animEffect transition="in" filter="fade">
+                                      <p:cBhvr>
+                                        <p:cTn id="18" dur="1000"/>
+                                        <p:tgtEl>
+                                          <p:spTgt spid="1026"/>
+                                        </p:tgtEl>
+                                      </p:cBhvr>
+                                    </p:animEffect>
+                                  </p:childTnLst>
+                                </p:cTn>
+                              </p:par>
+                            </p:childTnLst>
+                          </p:cTn>
+                        </p:par>
+                      </p:childTnLst>
+                    </p:cTn>
+                  </p:par>
+                  <p:par>
+                    <p:cTn id="19" fill="hold">
+                      <p:stCondLst>
+                        <p:cond delay="indefinite"/>
+                      </p:stCondLst>
+                      <p:childTnLst>
+                        <p:par>
+                          <p:cTn id="20" fill="hold">
+                            <p:stCondLst>
+                              <p:cond delay="0"/>
+                            </p:stCondLst>
+                            <p:childTnLst>
+                              <p:par>
+                                <p:cTn id="21" presetID="10" presetClass="entr" presetSubtype="0" fill="hold" nodeType="clickEffect">
+                                  <p:stCondLst>
+                                    <p:cond delay="0"/>
+                                  </p:stCondLst>
+                                  <p:childTnLst>
+                                    <p:set>
+                                      <p:cBhvr>
+                                        <p:cTn id="22" dur="1" fill="hold">
+                                          <p:stCondLst>
+                                            <p:cond delay="0"/>
+                                          </p:stCondLst>
+                                        </p:cTn>
+                                        <p:tgtEl>
+                                          <p:spTgt spid="3">
+                                            <p:txEl>
+                                              <p:pRg st="1" end="1"/>
+                                            </p:txEl>
+                                          </p:spTgt>
+                                        </p:tgtEl>
+                                        <p:attrNameLst>
+                                          <p:attrName>style.visibility</p:attrName>
+                                        </p:attrNameLst>
+                                      </p:cBhvr>
+                                      <p:to>
+                                        <p:strVal val="visible"/>
+                                      </p:to>
+                                    </p:set>
+                                    <p:animEffect transition="in" filter="fade">
+                                      <p:cBhvr>
+                                        <p:cTn id="23" dur="750"/>
+                                        <p:tgtEl>
+                                          <p:spTgt spid="3">
+                                            <p:txEl>
+                                              <p:pRg st="1" end="1"/>
+                                            </p:txEl>
+                                          </p:spTgt>
+                                        </p:tgtEl>
+                                      </p:cBhvr>
+                                    </p:animEffect>
+                                  </p:childTnLst>
+                                </p:cTn>
+                              </p:par>
+                              <p:par>
+                                <p:cTn id="24" presetID="42" presetClass="entr" presetSubtype="0" fill="hold" nodeType="withEffect">
+                                  <p:stCondLst>
+                                    <p:cond delay="0"/>
+                                  </p:stCondLst>
+                                  <p:childTnLst>
+                                    <p:set>
+                                      <p:cBhvr>
+                                        <p:cTn id="25" dur="1" fill="hold">
+                                          <p:stCondLst>
+                                            <p:cond delay="0"/>
+                                          </p:stCondLst>
+                                        </p:cTn>
+                                        <p:tgtEl>
+                                          <p:spTgt spid="1028"/>
+                                        </p:tgtEl>
+                                        <p:attrNameLst>
+                                          <p:attrName>style.visibility</p:attrName>
+                                        </p:attrNameLst>
+                                      </p:cBhvr>
+                                      <p:to>
+                                        <p:strVal val="visible"/>
+                                      </p:to>
+                                    </p:set>
+                                    <p:animEffect transition="in" filter="fade">
+                                      <p:cBhvr>
+                                        <p:cTn id="26" dur="1000"/>
+                                        <p:tgtEl>
+                                          <p:spTgt spid="1028"/>
+                                        </p:tgtEl>
+                                      </p:cBhvr>
+                                    </p:animEffect>
+                                    <p:anim calcmode="lin" valueType="num">
+                                      <p:cBhvr>
+                                        <p:cTn id="27" dur="1000" fill="hold"/>
+                                        <p:tgtEl>
+                                          <p:spTgt spid="1028"/>
+                                        </p:tgtEl>
+                                        <p:attrNameLst>
+                                          <p:attrName>ppt_x</p:attrName>
+                                        </p:attrNameLst>
+                                      </p:cBhvr>
+                                      <p:tavLst>
+                                        <p:tav tm="0">
+                                          <p:val>
+                                            <p:strVal val="#ppt_x"/>
+                                          </p:val>
+                                        </p:tav>
+                                        <p:tav tm="100000">
+                                          <p:val>
+                                            <p:strVal val="#ppt_x"/>
+                                          </p:val>
+                                        </p:tav>
+                                      </p:tavLst>
+                                    </p:anim>
+                                    <p:anim calcmode="lin" valueType="num">
+                                      <p:cBhvr>
+                                        <p:cTn id="28" dur="1000" fill="hold"/>
+                                        <p:tgtEl>
+                                          <p:spTgt spid="1028"/>
+                                        </p:tgtEl>
+                                        <p:attrNameLst>
+                                          <p:attrName>ppt_y</p:attrName>
+                                        </p:attrNameLst>
+                                      </p:cBhvr>
+                                      <p:tavLst>
+                                        <p:tav tm="0">
+                                          <p:val>
+                                            <p:strVal val="#ppt_y+.1"/>
+                                          </p:val>
+                                        </p:tav>
+                                        <p:tav tm="100000">
+                                          <p:val>
+                                            <p:strVal val="#ppt_y"/>
+                                          </p:val>
+                                        </p:tav>
+                                      </p:tavLst>
+                                    </p:anim>
+                                  </p:childTnLst>
+                                </p:cTn>
+                              </p:par>
+                            </p:childTnLst>
+                          </p:cTn>
+                        </p:par>
+                      </p:childTnLst>
+                    </p:cTn>
+                  </p:par>
+                  <p:par>
+                    <p:cTn id="29" fill="hold">
+                      <p:stCondLst>
+                        <p:cond delay="indefinite"/>
+                      </p:stCondLst>
+                      <p:childTnLst>
+                        <p:par>
+                          <p:cTn id="30" fill="hold">
+                            <p:stCondLst>
+                              <p:cond delay="0"/>
+                            </p:stCondLst>
+                            <p:childTnLst>
+                              <p:par>
+                                <p:cTn id="31" presetID="22" presetClass="entr" presetSubtype="1" fill="hold" nodeType="clickEffect">
+                                  <p:stCondLst>
+                                    <p:cond delay="0"/>
+                                  </p:stCondLst>
+                                  <p:childTnLst>
+                                    <p:set>
+                                      <p:cBhvr>
+                                        <p:cTn id="32" dur="1" fill="hold">
+                                          <p:stCondLst>
+                                            <p:cond delay="0"/>
+                                          </p:stCondLst>
+                                        </p:cTn>
+                                        <p:tgtEl>
+                                          <p:spTgt spid="3">
+                                            <p:txEl>
+                                              <p:pRg st="2" end="2"/>
+                                            </p:txEl>
+                                          </p:spTgt>
+                                        </p:tgtEl>
+                                        <p:attrNameLst>
+                                          <p:attrName>style.visibility</p:attrName>
+                                        </p:attrNameLst>
+                                      </p:cBhvr>
+                                      <p:to>
+                                        <p:strVal val="visible"/>
+                                      </p:to>
+                                    </p:set>
+                                    <p:animEffect transition="in" filter="wipe(up)">
+                                      <p:cBhvr>
+                                        <p:cTn id="33" dur="500"/>
+                                        <p:tgtEl>
+                                          <p:spTgt spid="3">
+                                            <p:txEl>
+                                              <p:pRg st="2" end="2"/>
+                                            </p:txEl>
+                                          </p:spTgt>
+                                        </p:tgtEl>
+                                      </p:cBhvr>
+                                    </p:animEffect>
+                                  </p:childTnLst>
+                                </p:cTn>
+                              </p:par>
+                            </p:childTnLst>
+                          </p:cTn>
+                        </p:par>
+                        <p:par>
+                          <p:cTn id="34" fill="hold">
+                            <p:stCondLst>
+                              <p:cond delay="500"/>
+                            </p:stCondLst>
+                            <p:childTnLst>
+                              <p:par>
+                                <p:cTn id="35" presetID="22" presetClass="entr" presetSubtype="1" fill="hold" nodeType="afterEffect">
+                                  <p:stCondLst>
+                                    <p:cond delay="0"/>
+                                  </p:stCondLst>
+                                  <p:childTnLst>
+                                    <p:set>
+                                      <p:cBhvr>
+                                        <p:cTn id="36" dur="1" fill="hold">
+                                          <p:stCondLst>
+                                            <p:cond delay="0"/>
+                                          </p:stCondLst>
+                                        </p:cTn>
+                                        <p:tgtEl>
+                                          <p:spTgt spid="3">
+                                            <p:txEl>
+                                              <p:pRg st="3" end="3"/>
+                                            </p:txEl>
+                                          </p:spTgt>
+                                        </p:tgtEl>
+                                        <p:attrNameLst>
+                                          <p:attrName>style.visibility</p:attrName>
+                                        </p:attrNameLst>
+                                      </p:cBhvr>
+                                      <p:to>
+                                        <p:strVal val="visible"/>
+                                      </p:to>
+                                    </p:set>
+                                    <p:animEffect transition="in" filter="wipe(up)">
+                                      <p:cBhvr>
+                                        <p:cTn id="37" dur="500"/>
+                                        <p:tgtEl>
+                                          <p:spTgt spid="3">
+                                            <p:txEl>
+                                              <p:pRg st="3" end="3"/>
+                                            </p:txEl>
+                                          </p:spTgt>
+                                        </p:tgtEl>
+                                      </p:cBhvr>
+                                    </p:animEffect>
+                                  </p:childTnLst>
+                                </p:cTn>
+                              </p:par>
+                            </p:childTnLst>
+                          </p:cTn>
+                        </p:par>
+                        <p:par>
+                          <p:cTn id="38" fill="hold">
+                            <p:stCondLst>
+                              <p:cond delay="1000"/>
+                            </p:stCondLst>
+                            <p:childTnLst>
+                              <p:par>
+                                <p:cTn id="39" presetID="22" presetClass="entr" presetSubtype="1" fill="hold" nodeType="afterEffect">
+                                  <p:stCondLst>
+                                    <p:cond delay="0"/>
+                                  </p:stCondLst>
+                                  <p:childTnLst>
+                                    <p:set>
+                                      <p:cBhvr>
+                                        <p:cTn id="40" dur="1" fill="hold">
+                                          <p:stCondLst>
+                                            <p:cond delay="0"/>
+                                          </p:stCondLst>
+                                        </p:cTn>
+                                        <p:tgtEl>
+                                          <p:spTgt spid="3">
+                                            <p:txEl>
+                                              <p:pRg st="4" end="4"/>
+                                            </p:txEl>
+                                          </p:spTgt>
+                                        </p:tgtEl>
+                                        <p:attrNameLst>
+                                          <p:attrName>style.visibility</p:attrName>
+                                        </p:attrNameLst>
+                                      </p:cBhvr>
+                                      <p:to>
+                                        <p:strVal val="visible"/>
+                                      </p:to>
+                                    </p:set>
+                                    <p:animEffect transition="in" filter="wipe(up)">
+                                      <p:cBhvr>
+                                        <p:cTn id="41" dur="500"/>
+                                        <p:tgtEl>
+                                          <p:spTgt spid="3">
+                                            <p:txEl>
+                                              <p:pRg st="4" end="4"/>
+                                            </p:txEl>
+                                          </p:spTgt>
+                                        </p:tgtEl>
+                                      </p:cBhvr>
+                                    </p:animEffect>
+                                  </p:childTnLst>
+                                </p:cTn>
+                              </p:par>
+                              <p:par>
+                                <p:cTn id="42" presetID="53" presetClass="entr" presetSubtype="16" fill="hold" nodeType="withEffect">
+                                  <p:stCondLst>
+                                    <p:cond delay="0"/>
+                                  </p:stCondLst>
+                                  <p:childTnLst>
+                                    <p:set>
+                                      <p:cBhvr>
+                                        <p:cTn id="43" dur="1" fill="hold">
+                                          <p:stCondLst>
+                                            <p:cond delay="0"/>
+                                          </p:stCondLst>
+                                        </p:cTn>
+                                        <p:tgtEl>
+                                          <p:spTgt spid="1030"/>
+                                        </p:tgtEl>
+                                        <p:attrNameLst>
+                                          <p:attrName>style.visibility</p:attrName>
+                                        </p:attrNameLst>
+                                      </p:cBhvr>
+                                      <p:to>
+                                        <p:strVal val="visible"/>
+                                      </p:to>
+                                    </p:set>
+                                    <p:anim calcmode="lin" valueType="num">
+                                      <p:cBhvr>
+                                        <p:cTn id="44" dur="750" fill="hold"/>
+                                        <p:tgtEl>
+                                          <p:spTgt spid="1030"/>
+                                        </p:tgtEl>
+                                        <p:attrNameLst>
+                                          <p:attrName>ppt_w</p:attrName>
+                                        </p:attrNameLst>
+                                      </p:cBhvr>
+                                      <p:tavLst>
+                                        <p:tav tm="0">
+                                          <p:val>
+                                            <p:fltVal val="0"/>
+                                          </p:val>
+                                        </p:tav>
+                                        <p:tav tm="100000">
+                                          <p:val>
+                                            <p:strVal val="#ppt_w"/>
+                                          </p:val>
+                                        </p:tav>
+                                      </p:tavLst>
+                                    </p:anim>
+                                    <p:anim calcmode="lin" valueType="num">
+                                      <p:cBhvr>
+                                        <p:cTn id="45" dur="750" fill="hold"/>
+                                        <p:tgtEl>
+                                          <p:spTgt spid="1030"/>
+                                        </p:tgtEl>
+                                        <p:attrNameLst>
+                                          <p:attrName>ppt_h</p:attrName>
+                                        </p:attrNameLst>
+                                      </p:cBhvr>
+                                      <p:tavLst>
+                                        <p:tav tm="0">
+                                          <p:val>
+                                            <p:fltVal val="0"/>
+                                          </p:val>
+                                        </p:tav>
+                                        <p:tav tm="100000">
+                                          <p:val>
+                                            <p:strVal val="#ppt_h"/>
+                                          </p:val>
+                                        </p:tav>
+                                      </p:tavLst>
+                                    </p:anim>
+                                    <p:animEffect transition="in" filter="fade">
+                                      <p:cBhvr>
+                                        <p:cTn id="46" dur="750"/>
+                                        <p:tgtEl>
+                                          <p:spTgt spid="1030"/>
+                                        </p:tgtEl>
+                                      </p:cBhvr>
+                                    </p:animEffect>
+                                  </p:childTnLst>
+                                </p:cTn>
+                              </p:par>
+                            </p:childTnLst>
+                          </p:cTn>
+                        </p:par>
+                      </p:childTnLst>
+                    </p:cTn>
+                  </p:par>
+                </p:childTnLst>
+              </p:cTn>
+              <p:prevCondLst>
+                <p:cond evt="onPrev" delay="0">
+                  <p:tgtEl>
+                    <p:sldTgt/>
+                  </p:tgtEl>
+                </p:cond>
+              </p:prevCondLst>
+              <p:nextCondLst>
+                <p:cond evt="onNext" delay="0">
+                  <p:tgtEl>
+                    <p:sldTgt/>
+                  </p:tgtEl>
+                </p:cond>
+              </p:nextCondLst>
+            </p:seq>
+          </p:childTnLst>
+        </p:cTn>
+      </p:par>
+    </p:tnLst>
+    <p:bldLst>
+      <p:bldP spid="2" grpId="0"/>
+    </p:bldLst>
+  </p:timing>
 </p:sld>
 </file>
 
@@ -8432,16 +9226,346 @@
           <a:bodyPr/>
           <a:lstStyle/>
           <a:p>
-            <a:endParaRPr lang="en-US"/>
+            <a:pPr algn="r" rtl="1"/>
+            <a:r>
+              <a:rPr lang="he-IL" dirty="0"/>
+              <a:t>הוויזואליזציה:</a:t>
+            </a:r>
+            <a:endParaRPr lang="en-US" dirty="0"/>
           </a:p>
         </p:txBody>
       </p:sp>
+      <p:pic>
+        <p:nvPicPr>
+          <p:cNvPr id="7" name="Picture 6" descr="Graphical user interface, chart, application&#10;&#10;Description automatically generated">
+            <a:extLst>
+              <a:ext uri="{FF2B5EF4-FFF2-40B4-BE49-F238E27FC236}">
+                <a16:creationId xmlns:a16="http://schemas.microsoft.com/office/drawing/2014/main" id="{3DD56B1B-0798-5BAA-E1E9-6BA034492FF7}"/>
+              </a:ext>
+            </a:extLst>
+          </p:cNvPr>
+          <p:cNvPicPr>
+            <a:picLocks noChangeAspect="1"/>
+          </p:cNvPicPr>
+          <p:nvPr/>
+        </p:nvPicPr>
+        <p:blipFill>
+          <a:blip r:embed="rId2">
+            <a:extLst>
+              <a:ext uri="{28A0092B-C50C-407E-A947-70E740481C1C}">
+                <a14:useLocalDpi xmlns:a14="http://schemas.microsoft.com/office/drawing/2010/main" val="0"/>
+              </a:ext>
+            </a:extLst>
+          </a:blip>
+          <a:stretch>
+            <a:fillRect/>
+          </a:stretch>
+        </p:blipFill>
+        <p:spPr>
+          <a:xfrm>
+            <a:off x="1537182" y="1537131"/>
+            <a:ext cx="9472675" cy="4619829"/>
+          </a:xfrm>
+          <a:prstGeom prst="rect">
+            <a:avLst/>
+          </a:prstGeom>
+        </p:spPr>
+      </p:pic>
+    </p:spTree>
+    <p:extLst>
+      <p:ext uri="{BB962C8B-B14F-4D97-AF65-F5344CB8AC3E}">
+        <p14:creationId xmlns:p14="http://schemas.microsoft.com/office/powerpoint/2010/main" val="3066837745"/>
+      </p:ext>
+    </p:extLst>
+  </p:cSld>
+  <p:clrMapOvr>
+    <a:masterClrMapping/>
+  </p:clrMapOvr>
+  <p:timing>
+    <p:tnLst>
+      <p:par>
+        <p:cTn id="1" dur="indefinite" restart="never" nodeType="tmRoot">
+          <p:childTnLst>
+            <p:seq concurrent="1" nextAc="seek">
+              <p:cTn id="2" dur="indefinite" nodeType="mainSeq">
+                <p:childTnLst>
+                  <p:par>
+                    <p:cTn id="3" fill="hold">
+                      <p:stCondLst>
+                        <p:cond delay="indefinite"/>
+                      </p:stCondLst>
+                      <p:childTnLst>
+                        <p:par>
+                          <p:cTn id="4" fill="hold">
+                            <p:stCondLst>
+                              <p:cond delay="0"/>
+                            </p:stCondLst>
+                            <p:childTnLst>
+                              <p:par>
+                                <p:cTn id="5" presetID="10" presetClass="entr" presetSubtype="0" fill="hold" grpId="0" nodeType="clickEffect">
+                                  <p:stCondLst>
+                                    <p:cond delay="0"/>
+                                  </p:stCondLst>
+                                  <p:childTnLst>
+                                    <p:set>
+                                      <p:cBhvr>
+                                        <p:cTn id="6" dur="1" fill="hold">
+                                          <p:stCondLst>
+                                            <p:cond delay="0"/>
+                                          </p:stCondLst>
+                                        </p:cTn>
+                                        <p:tgtEl>
+                                          <p:spTgt spid="2"/>
+                                        </p:tgtEl>
+                                        <p:attrNameLst>
+                                          <p:attrName>style.visibility</p:attrName>
+                                        </p:attrNameLst>
+                                      </p:cBhvr>
+                                      <p:to>
+                                        <p:strVal val="visible"/>
+                                      </p:to>
+                                    </p:set>
+                                    <p:animEffect transition="in" filter="fade">
+                                      <p:cBhvr>
+                                        <p:cTn id="7" dur="500"/>
+                                        <p:tgtEl>
+                                          <p:spTgt spid="2"/>
+                                        </p:tgtEl>
+                                      </p:cBhvr>
+                                    </p:animEffect>
+                                  </p:childTnLst>
+                                </p:cTn>
+                              </p:par>
+                            </p:childTnLst>
+                          </p:cTn>
+                        </p:par>
+                      </p:childTnLst>
+                    </p:cTn>
+                  </p:par>
+                  <p:par>
+                    <p:cTn id="8" fill="hold">
+                      <p:stCondLst>
+                        <p:cond delay="indefinite"/>
+                      </p:stCondLst>
+                      <p:childTnLst>
+                        <p:par>
+                          <p:cTn id="9" fill="hold">
+                            <p:stCondLst>
+                              <p:cond delay="0"/>
+                            </p:stCondLst>
+                            <p:childTnLst>
+                              <p:par>
+                                <p:cTn id="10" presetID="21" presetClass="entr" presetSubtype="2" fill="hold" nodeType="clickEffect">
+                                  <p:stCondLst>
+                                    <p:cond delay="0"/>
+                                  </p:stCondLst>
+                                  <p:childTnLst>
+                                    <p:set>
+                                      <p:cBhvr>
+                                        <p:cTn id="11" dur="1" fill="hold">
+                                          <p:stCondLst>
+                                            <p:cond delay="0"/>
+                                          </p:stCondLst>
+                                        </p:cTn>
+                                        <p:tgtEl>
+                                          <p:spTgt spid="7"/>
+                                        </p:tgtEl>
+                                        <p:attrNameLst>
+                                          <p:attrName>style.visibility</p:attrName>
+                                        </p:attrNameLst>
+                                      </p:cBhvr>
+                                      <p:to>
+                                        <p:strVal val="visible"/>
+                                      </p:to>
+                                    </p:set>
+                                    <p:animEffect transition="in" filter="wheel(2)">
+                                      <p:cBhvr>
+                                        <p:cTn id="12" dur="1000"/>
+                                        <p:tgtEl>
+                                          <p:spTgt spid="7"/>
+                                        </p:tgtEl>
+                                      </p:cBhvr>
+                                    </p:animEffect>
+                                  </p:childTnLst>
+                                </p:cTn>
+                              </p:par>
+                            </p:childTnLst>
+                          </p:cTn>
+                        </p:par>
+                      </p:childTnLst>
+                    </p:cTn>
+                  </p:par>
+                </p:childTnLst>
+              </p:cTn>
+              <p:prevCondLst>
+                <p:cond evt="onPrev" delay="0">
+                  <p:tgtEl>
+                    <p:sldTgt/>
+                  </p:tgtEl>
+                </p:cond>
+              </p:prevCondLst>
+              <p:nextCondLst>
+                <p:cond evt="onNext" delay="0">
+                  <p:tgtEl>
+                    <p:sldTgt/>
+                  </p:tgtEl>
+                </p:cond>
+              </p:nextCondLst>
+            </p:seq>
+          </p:childTnLst>
+        </p:cTn>
+      </p:par>
+    </p:tnLst>
+    <p:bldLst>
+      <p:bldP spid="2" grpId="0"/>
+    </p:bldLst>
+  </p:timing>
+</p:sld>
+</file>
+
+<file path=ppt/slides/slide7.xml><?xml version="1.0" encoding="utf-8"?>
+<p:sld xmlns:a="http://schemas.openxmlformats.org/drawingml/2006/main" xmlns:r="http://schemas.openxmlformats.org/officeDocument/2006/relationships" xmlns:p="http://schemas.openxmlformats.org/presentationml/2006/main">
+  <p:cSld>
+    <p:spTree>
+      <p:nvGrpSpPr>
+        <p:cNvPr id="1" name=""/>
+        <p:cNvGrpSpPr/>
+        <p:nvPr/>
+      </p:nvGrpSpPr>
+      <p:grpSpPr>
+        <a:xfrm>
+          <a:off x="0" y="0"/>
+          <a:ext cx="0" cy="0"/>
+          <a:chOff x="0" y="0"/>
+          <a:chExt cx="0" cy="0"/>
+        </a:xfrm>
+      </p:grpSpPr>
+      <p:pic>
+        <p:nvPicPr>
+          <p:cNvPr id="13" name="Picture 12">
+            <a:extLst>
+              <a:ext uri="{FF2B5EF4-FFF2-40B4-BE49-F238E27FC236}">
+                <a16:creationId xmlns:a16="http://schemas.microsoft.com/office/drawing/2014/main" id="{F0F9EAED-9CEC-FD4E-962F-23A3C2430222}"/>
+              </a:ext>
+            </a:extLst>
+          </p:cNvPr>
+          <p:cNvPicPr>
+            <a:picLocks noChangeAspect="1"/>
+          </p:cNvPicPr>
+          <p:nvPr/>
+        </p:nvPicPr>
+        <p:blipFill>
+          <a:blip r:embed="rId2"/>
+          <a:stretch>
+            <a:fillRect/>
+          </a:stretch>
+        </p:blipFill>
+        <p:spPr>
+          <a:xfrm rot="372491">
+            <a:off x="6731069" y="4408808"/>
+            <a:ext cx="4201974" cy="2359982"/>
+          </a:xfrm>
+          <a:prstGeom prst="rect">
+            <a:avLst/>
+          </a:prstGeom>
+        </p:spPr>
+      </p:pic>
+      <p:pic>
+        <p:nvPicPr>
+          <p:cNvPr id="11" name="Picture 10">
+            <a:extLst>
+              <a:ext uri="{FF2B5EF4-FFF2-40B4-BE49-F238E27FC236}">
+                <a16:creationId xmlns:a16="http://schemas.microsoft.com/office/drawing/2014/main" id="{72A56618-2B88-456D-2F6C-69F2C061BA78}"/>
+              </a:ext>
+            </a:extLst>
+          </p:cNvPr>
+          <p:cNvPicPr>
+            <a:picLocks noChangeAspect="1"/>
+          </p:cNvPicPr>
+          <p:nvPr/>
+        </p:nvPicPr>
+        <p:blipFill>
+          <a:blip r:embed="rId3"/>
+          <a:stretch>
+            <a:fillRect/>
+          </a:stretch>
+        </p:blipFill>
+        <p:spPr>
+          <a:xfrm rot="20744041">
+            <a:off x="1532102" y="4634472"/>
+            <a:ext cx="3829877" cy="2131356"/>
+          </a:xfrm>
+          <a:prstGeom prst="rect">
+            <a:avLst/>
+          </a:prstGeom>
+        </p:spPr>
+      </p:pic>
+      <p:pic>
+        <p:nvPicPr>
+          <p:cNvPr id="7" name="Picture 6">
+            <a:extLst>
+              <a:ext uri="{FF2B5EF4-FFF2-40B4-BE49-F238E27FC236}">
+                <a16:creationId xmlns:a16="http://schemas.microsoft.com/office/drawing/2014/main" id="{50DC9430-8D2B-B01D-A46F-2E6FEF823A77}"/>
+              </a:ext>
+            </a:extLst>
+          </p:cNvPr>
+          <p:cNvPicPr>
+            <a:picLocks noChangeAspect="1"/>
+          </p:cNvPicPr>
+          <p:nvPr/>
+        </p:nvPicPr>
+        <p:blipFill>
+          <a:blip r:embed="rId4"/>
+          <a:stretch>
+            <a:fillRect/>
+          </a:stretch>
+        </p:blipFill>
+        <p:spPr>
+          <a:xfrm rot="20975493">
+            <a:off x="5561586" y="1545181"/>
+            <a:ext cx="6100112" cy="1779199"/>
+          </a:xfrm>
+          <a:prstGeom prst="rect">
+            <a:avLst/>
+          </a:prstGeom>
+        </p:spPr>
+      </p:pic>
+      <p:pic>
+        <p:nvPicPr>
+          <p:cNvPr id="9" name="Picture 8">
+            <a:extLst>
+              <a:ext uri="{FF2B5EF4-FFF2-40B4-BE49-F238E27FC236}">
+                <a16:creationId xmlns:a16="http://schemas.microsoft.com/office/drawing/2014/main" id="{37C11FF9-52CB-CBF1-9665-E6FEFAF3C951}"/>
+              </a:ext>
+            </a:extLst>
+          </p:cNvPr>
+          <p:cNvPicPr>
+            <a:picLocks noChangeAspect="1"/>
+          </p:cNvPicPr>
+          <p:nvPr/>
+        </p:nvPicPr>
+        <p:blipFill>
+          <a:blip r:embed="rId5"/>
+          <a:stretch>
+            <a:fillRect/>
+          </a:stretch>
+        </p:blipFill>
+        <p:spPr>
+          <a:xfrm rot="20717787">
+            <a:off x="868548" y="1594469"/>
+            <a:ext cx="6230021" cy="1301500"/>
+          </a:xfrm>
+          <a:prstGeom prst="rect">
+            <a:avLst/>
+          </a:prstGeom>
+        </p:spPr>
+      </p:pic>
       <p:sp>
         <p:nvSpPr>
           <p:cNvPr id="3" name="Content Placeholder 2">
             <a:extLst>
               <a:ext uri="{FF2B5EF4-FFF2-40B4-BE49-F238E27FC236}">
-                <a16:creationId xmlns:a16="http://schemas.microsoft.com/office/drawing/2014/main" id="{6CFE0A17-DDEC-AC02-805C-ED50757EFDC0}"/>
+                <a16:creationId xmlns:a16="http://schemas.microsoft.com/office/drawing/2014/main" id="{3E73DB59-6452-ABD4-D9D3-1236533F751F}"/>
               </a:ext>
             </a:extLst>
           </p:cNvPr>
@@ -8452,19 +9576,533 @@
             <p:ph idx="1"/>
           </p:nvPr>
         </p:nvSpPr>
-        <p:spPr/>
+        <p:spPr>
+          <a:xfrm>
+            <a:off x="278297" y="3950278"/>
+            <a:ext cx="11196014" cy="969592"/>
+          </a:xfrm>
+        </p:spPr>
         <p:txBody>
-          <a:bodyPr/>
+          <a:bodyPr>
+            <a:normAutofit/>
+          </a:bodyPr>
           <a:lstStyle/>
           <a:p>
-            <a:endParaRPr lang="en-US"/>
+            <a:pPr marL="0" indent="0" algn="r" rtl="1">
+              <a:buNone/>
+            </a:pPr>
+            <a:r>
+              <a:rPr lang="he-IL" dirty="0"/>
+              <a:t>בנוסף לאלה יש גם תתי אופציות שנותנות מבט על מין או גזע ספציפי</a:t>
+            </a:r>
+            <a:br>
+              <a:rPr lang="en-US" dirty="0"/>
+            </a:br>
+            <a:endParaRPr lang="he-IL" dirty="0"/>
+          </a:p>
+        </p:txBody>
+      </p:sp>
+      <p:sp>
+        <p:nvSpPr>
+          <p:cNvPr id="5" name="TextBox 4">
+            <a:extLst>
+              <a:ext uri="{FF2B5EF4-FFF2-40B4-BE49-F238E27FC236}">
+                <a16:creationId xmlns:a16="http://schemas.microsoft.com/office/drawing/2014/main" id="{2395DE59-DD4C-2DC1-C2EC-FF34290652AC}"/>
+              </a:ext>
+            </a:extLst>
+          </p:cNvPr>
+          <p:cNvSpPr txBox="1"/>
+          <p:nvPr/>
+        </p:nvSpPr>
+        <p:spPr>
+          <a:xfrm>
+            <a:off x="1143000" y="681037"/>
+            <a:ext cx="9812405" cy="523220"/>
+          </a:xfrm>
+          <a:prstGeom prst="rect">
+            <a:avLst/>
+          </a:prstGeom>
+          <a:noFill/>
+        </p:spPr>
+        <p:txBody>
+          <a:bodyPr wrap="square">
+            <a:spAutoFit/>
+          </a:bodyPr>
+          <a:lstStyle/>
+          <a:p>
+            <a:pPr algn="r" rtl="1"/>
+            <a:r>
+              <a:rPr lang="he-IL" sz="2800" dirty="0"/>
+              <a:t>הוויזואליזציה שלנו נעה סביב 2 חלקים עיקריים שהם שנים ומדינות</a:t>
+            </a:r>
           </a:p>
         </p:txBody>
       </p:sp>
     </p:spTree>
     <p:extLst>
       <p:ext uri="{BB962C8B-B14F-4D97-AF65-F5344CB8AC3E}">
-        <p14:creationId xmlns:p14="http://schemas.microsoft.com/office/powerpoint/2010/main" val="3066837745"/>
+        <p14:creationId xmlns:p14="http://schemas.microsoft.com/office/powerpoint/2010/main" val="2220638997"/>
+      </p:ext>
+    </p:extLst>
+  </p:cSld>
+  <p:clrMapOvr>
+    <a:masterClrMapping/>
+  </p:clrMapOvr>
+  <p:timing>
+    <p:tnLst>
+      <p:par>
+        <p:cTn id="1" dur="indefinite" restart="never" nodeType="tmRoot">
+          <p:childTnLst>
+            <p:seq concurrent="1" nextAc="seek">
+              <p:cTn id="2" dur="indefinite" nodeType="mainSeq">
+                <p:childTnLst>
+                  <p:par>
+                    <p:cTn id="3" fill="hold">
+                      <p:stCondLst>
+                        <p:cond delay="indefinite"/>
+                      </p:stCondLst>
+                      <p:childTnLst>
+                        <p:par>
+                          <p:cTn id="4" fill="hold">
+                            <p:stCondLst>
+                              <p:cond delay="0"/>
+                            </p:stCondLst>
+                            <p:childTnLst>
+                              <p:par>
+                                <p:cTn id="5" presetID="10" presetClass="entr" presetSubtype="0" fill="hold" nodeType="clickEffect">
+                                  <p:stCondLst>
+                                    <p:cond delay="0"/>
+                                  </p:stCondLst>
+                                  <p:childTnLst>
+                                    <p:set>
+                                      <p:cBhvr>
+                                        <p:cTn id="6" dur="1" fill="hold">
+                                          <p:stCondLst>
+                                            <p:cond delay="0"/>
+                                          </p:stCondLst>
+                                        </p:cTn>
+                                        <p:tgtEl>
+                                          <p:spTgt spid="5">
+                                            <p:txEl>
+                                              <p:pRg st="0" end="0"/>
+                                            </p:txEl>
+                                          </p:spTgt>
+                                        </p:tgtEl>
+                                        <p:attrNameLst>
+                                          <p:attrName>style.visibility</p:attrName>
+                                        </p:attrNameLst>
+                                      </p:cBhvr>
+                                      <p:to>
+                                        <p:strVal val="visible"/>
+                                      </p:to>
+                                    </p:set>
+                                    <p:animEffect transition="in" filter="fade">
+                                      <p:cBhvr>
+                                        <p:cTn id="7" dur="500"/>
+                                        <p:tgtEl>
+                                          <p:spTgt spid="5">
+                                            <p:txEl>
+                                              <p:pRg st="0" end="0"/>
+                                            </p:txEl>
+                                          </p:spTgt>
+                                        </p:tgtEl>
+                                      </p:cBhvr>
+                                    </p:animEffect>
+                                  </p:childTnLst>
+                                </p:cTn>
+                              </p:par>
+                            </p:childTnLst>
+                          </p:cTn>
+                        </p:par>
+                        <p:par>
+                          <p:cTn id="8" fill="hold">
+                            <p:stCondLst>
+                              <p:cond delay="500"/>
+                            </p:stCondLst>
+                            <p:childTnLst>
+                              <p:par>
+                                <p:cTn id="9" presetID="22" presetClass="entr" presetSubtype="8" fill="hold" nodeType="afterEffect">
+                                  <p:stCondLst>
+                                    <p:cond delay="0"/>
+                                  </p:stCondLst>
+                                  <p:childTnLst>
+                                    <p:set>
+                                      <p:cBhvr>
+                                        <p:cTn id="10" dur="1" fill="hold">
+                                          <p:stCondLst>
+                                            <p:cond delay="0"/>
+                                          </p:stCondLst>
+                                        </p:cTn>
+                                        <p:tgtEl>
+                                          <p:spTgt spid="7"/>
+                                        </p:tgtEl>
+                                        <p:attrNameLst>
+                                          <p:attrName>style.visibility</p:attrName>
+                                        </p:attrNameLst>
+                                      </p:cBhvr>
+                                      <p:to>
+                                        <p:strVal val="visible"/>
+                                      </p:to>
+                                    </p:set>
+                                    <p:animEffect transition="in" filter="wipe(left)">
+                                      <p:cBhvr>
+                                        <p:cTn id="11" dur="750"/>
+                                        <p:tgtEl>
+                                          <p:spTgt spid="7"/>
+                                        </p:tgtEl>
+                                      </p:cBhvr>
+                                    </p:animEffect>
+                                  </p:childTnLst>
+                                </p:cTn>
+                              </p:par>
+                              <p:par>
+                                <p:cTn id="12" presetID="22" presetClass="entr" presetSubtype="4" fill="hold" nodeType="withEffect">
+                                  <p:stCondLst>
+                                    <p:cond delay="250"/>
+                                  </p:stCondLst>
+                                  <p:childTnLst>
+                                    <p:set>
+                                      <p:cBhvr>
+                                        <p:cTn id="13" dur="1" fill="hold">
+                                          <p:stCondLst>
+                                            <p:cond delay="0"/>
+                                          </p:stCondLst>
+                                        </p:cTn>
+                                        <p:tgtEl>
+                                          <p:spTgt spid="9"/>
+                                        </p:tgtEl>
+                                        <p:attrNameLst>
+                                          <p:attrName>style.visibility</p:attrName>
+                                        </p:attrNameLst>
+                                      </p:cBhvr>
+                                      <p:to>
+                                        <p:strVal val="visible"/>
+                                      </p:to>
+                                    </p:set>
+                                    <p:animEffect transition="in" filter="wipe(down)">
+                                      <p:cBhvr>
+                                        <p:cTn id="14" dur="750"/>
+                                        <p:tgtEl>
+                                          <p:spTgt spid="9"/>
+                                        </p:tgtEl>
+                                      </p:cBhvr>
+                                    </p:animEffect>
+                                  </p:childTnLst>
+                                </p:cTn>
+                              </p:par>
+                            </p:childTnLst>
+                          </p:cTn>
+                        </p:par>
+                      </p:childTnLst>
+                    </p:cTn>
+                  </p:par>
+                  <p:par>
+                    <p:cTn id="15" fill="hold">
+                      <p:stCondLst>
+                        <p:cond delay="indefinite"/>
+                      </p:stCondLst>
+                      <p:childTnLst>
+                        <p:par>
+                          <p:cTn id="16" fill="hold">
+                            <p:stCondLst>
+                              <p:cond delay="0"/>
+                            </p:stCondLst>
+                            <p:childTnLst>
+                              <p:par>
+                                <p:cTn id="17" presetID="10" presetClass="entr" presetSubtype="0" fill="hold" grpId="0" nodeType="clickEffect">
+                                  <p:stCondLst>
+                                    <p:cond delay="0"/>
+                                  </p:stCondLst>
+                                  <p:childTnLst>
+                                    <p:set>
+                                      <p:cBhvr>
+                                        <p:cTn id="18" dur="1" fill="hold">
+                                          <p:stCondLst>
+                                            <p:cond delay="0"/>
+                                          </p:stCondLst>
+                                        </p:cTn>
+                                        <p:tgtEl>
+                                          <p:spTgt spid="3">
+                                            <p:txEl>
+                                              <p:pRg st="0" end="0"/>
+                                            </p:txEl>
+                                          </p:spTgt>
+                                        </p:tgtEl>
+                                        <p:attrNameLst>
+                                          <p:attrName>style.visibility</p:attrName>
+                                        </p:attrNameLst>
+                                      </p:cBhvr>
+                                      <p:to>
+                                        <p:strVal val="visible"/>
+                                      </p:to>
+                                    </p:set>
+                                    <p:animEffect transition="in" filter="fade">
+                                      <p:cBhvr>
+                                        <p:cTn id="19" dur="500"/>
+                                        <p:tgtEl>
+                                          <p:spTgt spid="3">
+                                            <p:txEl>
+                                              <p:pRg st="0" end="0"/>
+                                            </p:txEl>
+                                          </p:spTgt>
+                                        </p:tgtEl>
+                                      </p:cBhvr>
+                                    </p:animEffect>
+                                  </p:childTnLst>
+                                </p:cTn>
+                              </p:par>
+                            </p:childTnLst>
+                          </p:cTn>
+                        </p:par>
+                        <p:par>
+                          <p:cTn id="20" fill="hold">
+                            <p:stCondLst>
+                              <p:cond delay="500"/>
+                            </p:stCondLst>
+                            <p:childTnLst>
+                              <p:par>
+                                <p:cTn id="21" presetID="6" presetClass="entr" presetSubtype="32" fill="hold" nodeType="afterEffect">
+                                  <p:stCondLst>
+                                    <p:cond delay="0"/>
+                                  </p:stCondLst>
+                                  <p:childTnLst>
+                                    <p:set>
+                                      <p:cBhvr>
+                                        <p:cTn id="22" dur="1" fill="hold">
+                                          <p:stCondLst>
+                                            <p:cond delay="0"/>
+                                          </p:stCondLst>
+                                        </p:cTn>
+                                        <p:tgtEl>
+                                          <p:spTgt spid="13"/>
+                                        </p:tgtEl>
+                                        <p:attrNameLst>
+                                          <p:attrName>style.visibility</p:attrName>
+                                        </p:attrNameLst>
+                                      </p:cBhvr>
+                                      <p:to>
+                                        <p:strVal val="visible"/>
+                                      </p:to>
+                                    </p:set>
+                                    <p:animEffect transition="in" filter="circle(out)">
+                                      <p:cBhvr>
+                                        <p:cTn id="23" dur="1000"/>
+                                        <p:tgtEl>
+                                          <p:spTgt spid="13"/>
+                                        </p:tgtEl>
+                                      </p:cBhvr>
+                                    </p:animEffect>
+                                  </p:childTnLst>
+                                </p:cTn>
+                              </p:par>
+                              <p:par>
+                                <p:cTn id="24" presetID="6" presetClass="entr" presetSubtype="32" fill="hold" nodeType="withEffect">
+                                  <p:stCondLst>
+                                    <p:cond delay="0"/>
+                                  </p:stCondLst>
+                                  <p:childTnLst>
+                                    <p:set>
+                                      <p:cBhvr>
+                                        <p:cTn id="25" dur="1" fill="hold">
+                                          <p:stCondLst>
+                                            <p:cond delay="0"/>
+                                          </p:stCondLst>
+                                        </p:cTn>
+                                        <p:tgtEl>
+                                          <p:spTgt spid="11"/>
+                                        </p:tgtEl>
+                                        <p:attrNameLst>
+                                          <p:attrName>style.visibility</p:attrName>
+                                        </p:attrNameLst>
+                                      </p:cBhvr>
+                                      <p:to>
+                                        <p:strVal val="visible"/>
+                                      </p:to>
+                                    </p:set>
+                                    <p:animEffect transition="in" filter="circle(out)">
+                                      <p:cBhvr>
+                                        <p:cTn id="26" dur="1000"/>
+                                        <p:tgtEl>
+                                          <p:spTgt spid="11"/>
+                                        </p:tgtEl>
+                                      </p:cBhvr>
+                                    </p:animEffect>
+                                  </p:childTnLst>
+                                </p:cTn>
+                              </p:par>
+                            </p:childTnLst>
+                          </p:cTn>
+                        </p:par>
+                      </p:childTnLst>
+                    </p:cTn>
+                  </p:par>
+                </p:childTnLst>
+              </p:cTn>
+              <p:prevCondLst>
+                <p:cond evt="onPrev" delay="0">
+                  <p:tgtEl>
+                    <p:sldTgt/>
+                  </p:tgtEl>
+                </p:cond>
+              </p:prevCondLst>
+              <p:nextCondLst>
+                <p:cond evt="onNext" delay="0">
+                  <p:tgtEl>
+                    <p:sldTgt/>
+                  </p:tgtEl>
+                </p:cond>
+              </p:nextCondLst>
+            </p:seq>
+          </p:childTnLst>
+        </p:cTn>
+      </p:par>
+    </p:tnLst>
+    <p:bldLst>
+      <p:bldP spid="3" grpId="0" build="p"/>
+    </p:bldLst>
+  </p:timing>
+</p:sld>
+</file>
+
+<file path=ppt/slides/slide8.xml><?xml version="1.0" encoding="utf-8"?>
+<p:sld xmlns:a="http://schemas.openxmlformats.org/drawingml/2006/main" xmlns:r="http://schemas.openxmlformats.org/officeDocument/2006/relationships" xmlns:p="http://schemas.openxmlformats.org/presentationml/2006/main">
+  <p:cSld>
+    <p:spTree>
+      <p:nvGrpSpPr>
+        <p:cNvPr id="1" name=""/>
+        <p:cNvGrpSpPr/>
+        <p:nvPr/>
+      </p:nvGrpSpPr>
+      <p:grpSpPr>
+        <a:xfrm>
+          <a:off x="0" y="0"/>
+          <a:ext cx="0" cy="0"/>
+          <a:chOff x="0" y="0"/>
+          <a:chExt cx="0" cy="0"/>
+        </a:xfrm>
+      </p:grpSpPr>
+      <p:sp>
+        <p:nvSpPr>
+          <p:cNvPr id="4" name="TextBox 3">
+            <a:extLst>
+              <a:ext uri="{FF2B5EF4-FFF2-40B4-BE49-F238E27FC236}">
+                <a16:creationId xmlns:a16="http://schemas.microsoft.com/office/drawing/2014/main" id="{3BD6656C-CEA3-763B-E54A-CEAC42553996}"/>
+              </a:ext>
+            </a:extLst>
+          </p:cNvPr>
+          <p:cNvSpPr txBox="1"/>
+          <p:nvPr/>
+        </p:nvSpPr>
+        <p:spPr>
+          <a:xfrm>
+            <a:off x="2955104" y="2339603"/>
+            <a:ext cx="6281791" cy="1323439"/>
+          </a:xfrm>
+          <a:prstGeom prst="rect">
+            <a:avLst/>
+          </a:prstGeom>
+          <a:noFill/>
+        </p:spPr>
+        <p:txBody>
+          <a:bodyPr wrap="square" rtlCol="0">
+            <a:spAutoFit/>
+          </a:bodyPr>
+          <a:lstStyle/>
+          <a:p>
+            <a:pPr algn="ctr"/>
+            <a:r>
+              <a:rPr lang="he-IL" sz="4000" dirty="0">
+                <a:solidFill>
+                  <a:srgbClr val="FF0000"/>
+                </a:solidFill>
+              </a:rPr>
+              <a:t>להוסיף סרטון קצר של איך הוויזואיזציה עובדת</a:t>
+            </a:r>
+            <a:endParaRPr lang="en-US" sz="4000" dirty="0">
+              <a:solidFill>
+                <a:srgbClr val="FF0000"/>
+              </a:solidFill>
+            </a:endParaRPr>
+          </a:p>
+        </p:txBody>
+      </p:sp>
+    </p:spTree>
+    <p:extLst>
+      <p:ext uri="{BB962C8B-B14F-4D97-AF65-F5344CB8AC3E}">
+        <p14:creationId xmlns:p14="http://schemas.microsoft.com/office/powerpoint/2010/main" val="540556854"/>
+      </p:ext>
+    </p:extLst>
+  </p:cSld>
+  <p:clrMapOvr>
+    <a:masterClrMapping/>
+  </p:clrMapOvr>
+</p:sld>
+</file>
+
+<file path=ppt/slides/slide9.xml><?xml version="1.0" encoding="utf-8"?>
+<p:sld xmlns:a="http://schemas.openxmlformats.org/drawingml/2006/main" xmlns:r="http://schemas.openxmlformats.org/officeDocument/2006/relationships" xmlns:p="http://schemas.openxmlformats.org/presentationml/2006/main">
+  <p:cSld>
+    <p:spTree>
+      <p:nvGrpSpPr>
+        <p:cNvPr id="1" name=""/>
+        <p:cNvGrpSpPr/>
+        <p:nvPr/>
+      </p:nvGrpSpPr>
+      <p:grpSpPr>
+        <a:xfrm>
+          <a:off x="0" y="0"/>
+          <a:ext cx="0" cy="0"/>
+          <a:chOff x="0" y="0"/>
+          <a:chExt cx="0" cy="0"/>
+        </a:xfrm>
+      </p:grpSpPr>
+      <p:sp>
+        <p:nvSpPr>
+          <p:cNvPr id="2" name="Title 1">
+            <a:extLst>
+              <a:ext uri="{FF2B5EF4-FFF2-40B4-BE49-F238E27FC236}">
+                <a16:creationId xmlns:a16="http://schemas.microsoft.com/office/drawing/2014/main" id="{B4E682DA-3AAB-9BF1-4D95-655845FE3ECF}"/>
+              </a:ext>
+            </a:extLst>
+          </p:cNvPr>
+          <p:cNvSpPr>
+            <a:spLocks noGrp="1"/>
+          </p:cNvSpPr>
+          <p:nvPr>
+            <p:ph type="title"/>
+          </p:nvPr>
+        </p:nvSpPr>
+        <p:spPr>
+          <a:xfrm>
+            <a:off x="714910" y="1906248"/>
+            <a:ext cx="10515600" cy="1325563"/>
+          </a:xfrm>
+        </p:spPr>
+        <p:txBody>
+          <a:bodyPr/>
+          <a:lstStyle/>
+          <a:p>
+            <a:pPr algn="ctr"/>
+            <a:r>
+              <a:rPr lang="he-IL" dirty="0">
+                <a:solidFill>
+                  <a:srgbClr val="FF0000"/>
+                </a:solidFill>
+              </a:rPr>
+              <a:t>להוסיף תובנות מהסרטון, כגון איך אנחנו עונים על השאלות שהוויזואליזציה צריכה לענות עליהן</a:t>
+            </a:r>
+            <a:endParaRPr lang="en-US" dirty="0">
+              <a:solidFill>
+                <a:srgbClr val="FF0000"/>
+              </a:solidFill>
+            </a:endParaRPr>
+          </a:p>
+        </p:txBody>
+      </p:sp>
+    </p:spTree>
+    <p:extLst>
+      <p:ext uri="{BB962C8B-B14F-4D97-AF65-F5344CB8AC3E}">
+        <p14:creationId xmlns:p14="http://schemas.microsoft.com/office/powerpoint/2010/main" val="266724422"/>
       </p:ext>
     </p:extLst>
   </p:cSld>

</xml_diff>